<commit_message>
Make changes of the documents.
</commit_message>
<xml_diff>
--- a/Documents/TaxiBook.pptx
+++ b/Documents/TaxiBook.pptx
@@ -5,7 +5,7 @@
     <p:sldMasterId id="2147483681" r:id="rId1"/>
   </p:sldMasterIdLst>
   <p:notesMasterIdLst>
-    <p:notesMasterId r:id="rId12"/>
+    <p:notesMasterId r:id="rId18"/>
   </p:notesMasterIdLst>
   <p:sldIdLst>
     <p:sldId id="256" r:id="rId2"/>
@@ -15,45 +15,51 @@
     <p:sldId id="261" r:id="rId6"/>
     <p:sldId id="291" r:id="rId7"/>
     <p:sldId id="262" r:id="rId8"/>
-    <p:sldId id="286" r:id="rId9"/>
-    <p:sldId id="292" r:id="rId10"/>
-    <p:sldId id="289" r:id="rId11"/>
+    <p:sldId id="298" r:id="rId9"/>
+    <p:sldId id="286" r:id="rId10"/>
+    <p:sldId id="294" r:id="rId11"/>
+    <p:sldId id="293" r:id="rId12"/>
+    <p:sldId id="295" r:id="rId13"/>
+    <p:sldId id="296" r:id="rId14"/>
+    <p:sldId id="297" r:id="rId15"/>
+    <p:sldId id="292" r:id="rId16"/>
+    <p:sldId id="289" r:id="rId17"/>
   </p:sldIdLst>
   <p:sldSz cx="9144000" cy="5143500" type="screen16x9"/>
   <p:notesSz cx="6858000" cy="9144000"/>
   <p:embeddedFontLst>
     <p:embeddedFont>
       <p:font typeface="Barlow" panose="00000500000000000000" pitchFamily="2" charset="0"/>
-      <p:regular r:id="rId13"/>
-      <p:bold r:id="rId14"/>
-      <p:italic r:id="rId15"/>
-      <p:boldItalic r:id="rId16"/>
+      <p:regular r:id="rId19"/>
+      <p:bold r:id="rId20"/>
+      <p:italic r:id="rId21"/>
+      <p:boldItalic r:id="rId22"/>
     </p:embeddedFont>
     <p:embeddedFont>
       <p:font typeface="Barlow Medium" panose="00000600000000000000" pitchFamily="2" charset="0"/>
-      <p:regular r:id="rId17"/>
-      <p:bold r:id="rId18"/>
-      <p:italic r:id="rId19"/>
-      <p:boldItalic r:id="rId20"/>
+      <p:regular r:id="rId23"/>
+      <p:bold r:id="rId24"/>
+      <p:italic r:id="rId25"/>
+      <p:boldItalic r:id="rId26"/>
     </p:embeddedFont>
     <p:embeddedFont>
       <p:font typeface="Exo 2" panose="020B0604020202020204" charset="0"/>
-      <p:regular r:id="rId21"/>
-      <p:bold r:id="rId22"/>
-      <p:italic r:id="rId23"/>
-      <p:boldItalic r:id="rId24"/>
+      <p:regular r:id="rId27"/>
+      <p:bold r:id="rId28"/>
+      <p:italic r:id="rId29"/>
+      <p:boldItalic r:id="rId30"/>
     </p:embeddedFont>
     <p:embeddedFont>
       <p:font typeface="Nunito" pitchFamily="2" charset="0"/>
-      <p:regular r:id="rId25"/>
-      <p:bold r:id="rId26"/>
-      <p:italic r:id="rId27"/>
-      <p:boldItalic r:id="rId28"/>
+      <p:regular r:id="rId31"/>
+      <p:bold r:id="rId32"/>
+      <p:italic r:id="rId33"/>
+      <p:boldItalic r:id="rId34"/>
     </p:embeddedFont>
     <p:embeddedFont>
       <p:font typeface="Roboto Condensed Light" panose="02000000000000000000" pitchFamily="2" charset="0"/>
-      <p:regular r:id="rId29"/>
-      <p:italic r:id="rId30"/>
+      <p:regular r:id="rId35"/>
+      <p:italic r:id="rId36"/>
     </p:embeddedFont>
   </p:embeddedFontLst>
   <p:defaultTextStyle>
@@ -4306,6 +4312,660 @@
   <p:cSld>
     <p:spTree>
       <p:nvGrpSpPr>
+        <p:cNvPr id="1" name="Shape 732"/>
+        <p:cNvGrpSpPr/>
+        <p:nvPr/>
+      </p:nvGrpSpPr>
+      <p:grpSpPr>
+        <a:xfrm>
+          <a:off x="0" y="0"/>
+          <a:ext cx="0" cy="0"/>
+          <a:chOff x="0" y="0"/>
+          <a:chExt cx="0" cy="0"/>
+        </a:xfrm>
+      </p:grpSpPr>
+      <p:sp>
+        <p:nvSpPr>
+          <p:cNvPr id="733" name="Google Shape;733;ga953684262_0_15522:notes"/>
+          <p:cNvSpPr>
+            <a:spLocks noGrp="1" noRot="1" noChangeAspect="1"/>
+          </p:cNvSpPr>
+          <p:nvPr>
+            <p:ph type="sldImg" idx="2"/>
+          </p:nvPr>
+        </p:nvSpPr>
+        <p:spPr>
+          <a:xfrm>
+            <a:off x="381000" y="685800"/>
+            <a:ext cx="6096000" cy="3429000"/>
+          </a:xfrm>
+          <a:custGeom>
+            <a:avLst/>
+            <a:gdLst/>
+            <a:ahLst/>
+            <a:cxnLst/>
+            <a:rect l="l" t="t" r="r" b="b"/>
+            <a:pathLst>
+              <a:path w="120000" h="120000" extrusionOk="0">
+                <a:moveTo>
+                  <a:pt x="0" y="0"/>
+                </a:moveTo>
+                <a:lnTo>
+                  <a:pt x="120000" y="0"/>
+                </a:lnTo>
+                <a:lnTo>
+                  <a:pt x="120000" y="120000"/>
+                </a:lnTo>
+                <a:lnTo>
+                  <a:pt x="0" y="120000"/>
+                </a:lnTo>
+                <a:close/>
+              </a:path>
+            </a:pathLst>
+          </a:custGeom>
+        </p:spPr>
+      </p:sp>
+      <p:sp>
+        <p:nvSpPr>
+          <p:cNvPr id="734" name="Google Shape;734;ga953684262_0_15522:notes"/>
+          <p:cNvSpPr txBox="1">
+            <a:spLocks noGrp="1"/>
+          </p:cNvSpPr>
+          <p:nvPr>
+            <p:ph type="body" idx="1"/>
+          </p:nvPr>
+        </p:nvSpPr>
+        <p:spPr>
+          <a:xfrm>
+            <a:off x="685800" y="4343400"/>
+            <a:ext cx="5486400" cy="4114800"/>
+          </a:xfrm>
+          <a:prstGeom prst="rect">
+            <a:avLst/>
+          </a:prstGeom>
+        </p:spPr>
+        <p:txBody>
+          <a:bodyPr spcFirstLastPara="1" wrap="square" lIns="91425" tIns="91425" rIns="91425" bIns="91425" anchor="t" anchorCtr="0">
+            <a:noAutofit/>
+          </a:bodyPr>
+          <a:lstStyle/>
+          <a:p>
+            <a:pPr marL="0" lvl="0" indent="0" algn="l" rtl="0">
+              <a:spcBef>
+                <a:spcPts val="0"/>
+              </a:spcBef>
+              <a:spcAft>
+                <a:spcPts val="0"/>
+              </a:spcAft>
+              <a:buNone/>
+            </a:pPr>
+            <a:endParaRPr/>
+          </a:p>
+        </p:txBody>
+      </p:sp>
+    </p:spTree>
+    <p:extLst>
+      <p:ext uri="{BB962C8B-B14F-4D97-AF65-F5344CB8AC3E}">
+        <p14:creationId xmlns:p14="http://schemas.microsoft.com/office/powerpoint/2010/main" val="34925056"/>
+      </p:ext>
+    </p:extLst>
+  </p:cSld>
+  <p:clrMapOvr>
+    <a:masterClrMapping/>
+  </p:clrMapOvr>
+</p:notes>
+</file>
+
+<file path=ppt/notesSlides/notesSlide11.xml><?xml version="1.0" encoding="utf-8"?>
+<p:notes xmlns:a="http://schemas.openxmlformats.org/drawingml/2006/main" xmlns:r="http://schemas.openxmlformats.org/officeDocument/2006/relationships" xmlns:p="http://schemas.openxmlformats.org/presentationml/2006/main" showMasterSp="0" showMasterPhAnim="0">
+  <p:cSld>
+    <p:spTree>
+      <p:nvGrpSpPr>
+        <p:cNvPr id="1" name="Shape 1782"/>
+        <p:cNvGrpSpPr/>
+        <p:nvPr/>
+      </p:nvGrpSpPr>
+      <p:grpSpPr>
+        <a:xfrm>
+          <a:off x="0" y="0"/>
+          <a:ext cx="0" cy="0"/>
+          <a:chOff x="0" y="0"/>
+          <a:chExt cx="0" cy="0"/>
+        </a:xfrm>
+      </p:grpSpPr>
+      <p:sp>
+        <p:nvSpPr>
+          <p:cNvPr id="1783" name="Google Shape;1783;gbe19a8e5dc_0_168:notes"/>
+          <p:cNvSpPr>
+            <a:spLocks noGrp="1" noRot="1" noChangeAspect="1"/>
+          </p:cNvSpPr>
+          <p:nvPr>
+            <p:ph type="sldImg" idx="2"/>
+          </p:nvPr>
+        </p:nvSpPr>
+        <p:spPr>
+          <a:xfrm>
+            <a:off x="381000" y="685800"/>
+            <a:ext cx="6096000" cy="3429000"/>
+          </a:xfrm>
+          <a:custGeom>
+            <a:avLst/>
+            <a:gdLst/>
+            <a:ahLst/>
+            <a:cxnLst/>
+            <a:rect l="l" t="t" r="r" b="b"/>
+            <a:pathLst>
+              <a:path w="120000" h="120000" extrusionOk="0">
+                <a:moveTo>
+                  <a:pt x="0" y="0"/>
+                </a:moveTo>
+                <a:lnTo>
+                  <a:pt x="120000" y="0"/>
+                </a:lnTo>
+                <a:lnTo>
+                  <a:pt x="120000" y="120000"/>
+                </a:lnTo>
+                <a:lnTo>
+                  <a:pt x="0" y="120000"/>
+                </a:lnTo>
+                <a:close/>
+              </a:path>
+            </a:pathLst>
+          </a:custGeom>
+        </p:spPr>
+      </p:sp>
+      <p:sp>
+        <p:nvSpPr>
+          <p:cNvPr id="1784" name="Google Shape;1784;gbe19a8e5dc_0_168:notes"/>
+          <p:cNvSpPr txBox="1">
+            <a:spLocks noGrp="1"/>
+          </p:cNvSpPr>
+          <p:nvPr>
+            <p:ph type="body" idx="1"/>
+          </p:nvPr>
+        </p:nvSpPr>
+        <p:spPr>
+          <a:xfrm>
+            <a:off x="685800" y="4343400"/>
+            <a:ext cx="5486400" cy="4114800"/>
+          </a:xfrm>
+          <a:prstGeom prst="rect">
+            <a:avLst/>
+          </a:prstGeom>
+        </p:spPr>
+        <p:txBody>
+          <a:bodyPr spcFirstLastPara="1" wrap="square" lIns="91425" tIns="91425" rIns="91425" bIns="91425" anchor="t" anchorCtr="0">
+            <a:noAutofit/>
+          </a:bodyPr>
+          <a:lstStyle/>
+          <a:p>
+            <a:pPr marL="0" lvl="0" indent="0" algn="l" rtl="0">
+              <a:spcBef>
+                <a:spcPts val="0"/>
+              </a:spcBef>
+              <a:spcAft>
+                <a:spcPts val="0"/>
+              </a:spcAft>
+              <a:buNone/>
+            </a:pPr>
+            <a:endParaRPr/>
+          </a:p>
+        </p:txBody>
+      </p:sp>
+    </p:spTree>
+    <p:extLst>
+      <p:ext uri="{BB962C8B-B14F-4D97-AF65-F5344CB8AC3E}">
+        <p14:creationId xmlns:p14="http://schemas.microsoft.com/office/powerpoint/2010/main" val="1993844699"/>
+      </p:ext>
+    </p:extLst>
+  </p:cSld>
+  <p:clrMapOvr>
+    <a:masterClrMapping/>
+  </p:clrMapOvr>
+</p:notes>
+</file>
+
+<file path=ppt/notesSlides/notesSlide12.xml><?xml version="1.0" encoding="utf-8"?>
+<p:notes xmlns:a="http://schemas.openxmlformats.org/drawingml/2006/main" xmlns:r="http://schemas.openxmlformats.org/officeDocument/2006/relationships" xmlns:p="http://schemas.openxmlformats.org/presentationml/2006/main" showMasterSp="0" showMasterPhAnim="0">
+  <p:cSld>
+    <p:spTree>
+      <p:nvGrpSpPr>
+        <p:cNvPr id="1" name="Shape 1782"/>
+        <p:cNvGrpSpPr/>
+        <p:nvPr/>
+      </p:nvGrpSpPr>
+      <p:grpSpPr>
+        <a:xfrm>
+          <a:off x="0" y="0"/>
+          <a:ext cx="0" cy="0"/>
+          <a:chOff x="0" y="0"/>
+          <a:chExt cx="0" cy="0"/>
+        </a:xfrm>
+      </p:grpSpPr>
+      <p:sp>
+        <p:nvSpPr>
+          <p:cNvPr id="1783" name="Google Shape;1783;gbe19a8e5dc_0_168:notes"/>
+          <p:cNvSpPr>
+            <a:spLocks noGrp="1" noRot="1" noChangeAspect="1"/>
+          </p:cNvSpPr>
+          <p:nvPr>
+            <p:ph type="sldImg" idx="2"/>
+          </p:nvPr>
+        </p:nvSpPr>
+        <p:spPr>
+          <a:xfrm>
+            <a:off x="381000" y="685800"/>
+            <a:ext cx="6096000" cy="3429000"/>
+          </a:xfrm>
+          <a:custGeom>
+            <a:avLst/>
+            <a:gdLst/>
+            <a:ahLst/>
+            <a:cxnLst/>
+            <a:rect l="l" t="t" r="r" b="b"/>
+            <a:pathLst>
+              <a:path w="120000" h="120000" extrusionOk="0">
+                <a:moveTo>
+                  <a:pt x="0" y="0"/>
+                </a:moveTo>
+                <a:lnTo>
+                  <a:pt x="120000" y="0"/>
+                </a:lnTo>
+                <a:lnTo>
+                  <a:pt x="120000" y="120000"/>
+                </a:lnTo>
+                <a:lnTo>
+                  <a:pt x="0" y="120000"/>
+                </a:lnTo>
+                <a:close/>
+              </a:path>
+            </a:pathLst>
+          </a:custGeom>
+        </p:spPr>
+      </p:sp>
+      <p:sp>
+        <p:nvSpPr>
+          <p:cNvPr id="1784" name="Google Shape;1784;gbe19a8e5dc_0_168:notes"/>
+          <p:cNvSpPr txBox="1">
+            <a:spLocks noGrp="1"/>
+          </p:cNvSpPr>
+          <p:nvPr>
+            <p:ph type="body" idx="1"/>
+          </p:nvPr>
+        </p:nvSpPr>
+        <p:spPr>
+          <a:xfrm>
+            <a:off x="685800" y="4343400"/>
+            <a:ext cx="5486400" cy="4114800"/>
+          </a:xfrm>
+          <a:prstGeom prst="rect">
+            <a:avLst/>
+          </a:prstGeom>
+        </p:spPr>
+        <p:txBody>
+          <a:bodyPr spcFirstLastPara="1" wrap="square" lIns="91425" tIns="91425" rIns="91425" bIns="91425" anchor="t" anchorCtr="0">
+            <a:noAutofit/>
+          </a:bodyPr>
+          <a:lstStyle/>
+          <a:p>
+            <a:pPr marL="0" lvl="0" indent="0" algn="l" rtl="0">
+              <a:spcBef>
+                <a:spcPts val="0"/>
+              </a:spcBef>
+              <a:spcAft>
+                <a:spcPts val="0"/>
+              </a:spcAft>
+              <a:buNone/>
+            </a:pPr>
+            <a:endParaRPr/>
+          </a:p>
+        </p:txBody>
+      </p:sp>
+    </p:spTree>
+    <p:extLst>
+      <p:ext uri="{BB962C8B-B14F-4D97-AF65-F5344CB8AC3E}">
+        <p14:creationId xmlns:p14="http://schemas.microsoft.com/office/powerpoint/2010/main" val="1685309549"/>
+      </p:ext>
+    </p:extLst>
+  </p:cSld>
+  <p:clrMapOvr>
+    <a:masterClrMapping/>
+  </p:clrMapOvr>
+</p:notes>
+</file>
+
+<file path=ppt/notesSlides/notesSlide13.xml><?xml version="1.0" encoding="utf-8"?>
+<p:notes xmlns:a="http://schemas.openxmlformats.org/drawingml/2006/main" xmlns:r="http://schemas.openxmlformats.org/officeDocument/2006/relationships" xmlns:p="http://schemas.openxmlformats.org/presentationml/2006/main" showMasterSp="0" showMasterPhAnim="0">
+  <p:cSld>
+    <p:spTree>
+      <p:nvGrpSpPr>
+        <p:cNvPr id="1" name="Shape 1782"/>
+        <p:cNvGrpSpPr/>
+        <p:nvPr/>
+      </p:nvGrpSpPr>
+      <p:grpSpPr>
+        <a:xfrm>
+          <a:off x="0" y="0"/>
+          <a:ext cx="0" cy="0"/>
+          <a:chOff x="0" y="0"/>
+          <a:chExt cx="0" cy="0"/>
+        </a:xfrm>
+      </p:grpSpPr>
+      <p:sp>
+        <p:nvSpPr>
+          <p:cNvPr id="1783" name="Google Shape;1783;gbe19a8e5dc_0_168:notes"/>
+          <p:cNvSpPr>
+            <a:spLocks noGrp="1" noRot="1" noChangeAspect="1"/>
+          </p:cNvSpPr>
+          <p:nvPr>
+            <p:ph type="sldImg" idx="2"/>
+          </p:nvPr>
+        </p:nvSpPr>
+        <p:spPr>
+          <a:xfrm>
+            <a:off x="381000" y="685800"/>
+            <a:ext cx="6096000" cy="3429000"/>
+          </a:xfrm>
+          <a:custGeom>
+            <a:avLst/>
+            <a:gdLst/>
+            <a:ahLst/>
+            <a:cxnLst/>
+            <a:rect l="l" t="t" r="r" b="b"/>
+            <a:pathLst>
+              <a:path w="120000" h="120000" extrusionOk="0">
+                <a:moveTo>
+                  <a:pt x="0" y="0"/>
+                </a:moveTo>
+                <a:lnTo>
+                  <a:pt x="120000" y="0"/>
+                </a:lnTo>
+                <a:lnTo>
+                  <a:pt x="120000" y="120000"/>
+                </a:lnTo>
+                <a:lnTo>
+                  <a:pt x="0" y="120000"/>
+                </a:lnTo>
+                <a:close/>
+              </a:path>
+            </a:pathLst>
+          </a:custGeom>
+        </p:spPr>
+      </p:sp>
+      <p:sp>
+        <p:nvSpPr>
+          <p:cNvPr id="1784" name="Google Shape;1784;gbe19a8e5dc_0_168:notes"/>
+          <p:cNvSpPr txBox="1">
+            <a:spLocks noGrp="1"/>
+          </p:cNvSpPr>
+          <p:nvPr>
+            <p:ph type="body" idx="1"/>
+          </p:nvPr>
+        </p:nvSpPr>
+        <p:spPr>
+          <a:xfrm>
+            <a:off x="685800" y="4343400"/>
+            <a:ext cx="5486400" cy="4114800"/>
+          </a:xfrm>
+          <a:prstGeom prst="rect">
+            <a:avLst/>
+          </a:prstGeom>
+        </p:spPr>
+        <p:txBody>
+          <a:bodyPr spcFirstLastPara="1" wrap="square" lIns="91425" tIns="91425" rIns="91425" bIns="91425" anchor="t" anchorCtr="0">
+            <a:noAutofit/>
+          </a:bodyPr>
+          <a:lstStyle/>
+          <a:p>
+            <a:pPr marL="0" lvl="0" indent="0" algn="l" rtl="0">
+              <a:spcBef>
+                <a:spcPts val="0"/>
+              </a:spcBef>
+              <a:spcAft>
+                <a:spcPts val="0"/>
+              </a:spcAft>
+              <a:buNone/>
+            </a:pPr>
+            <a:endParaRPr/>
+          </a:p>
+        </p:txBody>
+      </p:sp>
+    </p:spTree>
+    <p:extLst>
+      <p:ext uri="{BB962C8B-B14F-4D97-AF65-F5344CB8AC3E}">
+        <p14:creationId xmlns:p14="http://schemas.microsoft.com/office/powerpoint/2010/main" val="1545386086"/>
+      </p:ext>
+    </p:extLst>
+  </p:cSld>
+  <p:clrMapOvr>
+    <a:masterClrMapping/>
+  </p:clrMapOvr>
+</p:notes>
+</file>
+
+<file path=ppt/notesSlides/notesSlide14.xml><?xml version="1.0" encoding="utf-8"?>
+<p:notes xmlns:a="http://schemas.openxmlformats.org/drawingml/2006/main" xmlns:r="http://schemas.openxmlformats.org/officeDocument/2006/relationships" xmlns:p="http://schemas.openxmlformats.org/presentationml/2006/main" showMasterSp="0" showMasterPhAnim="0">
+  <p:cSld>
+    <p:spTree>
+      <p:nvGrpSpPr>
+        <p:cNvPr id="1" name="Shape 1782"/>
+        <p:cNvGrpSpPr/>
+        <p:nvPr/>
+      </p:nvGrpSpPr>
+      <p:grpSpPr>
+        <a:xfrm>
+          <a:off x="0" y="0"/>
+          <a:ext cx="0" cy="0"/>
+          <a:chOff x="0" y="0"/>
+          <a:chExt cx="0" cy="0"/>
+        </a:xfrm>
+      </p:grpSpPr>
+      <p:sp>
+        <p:nvSpPr>
+          <p:cNvPr id="1783" name="Google Shape;1783;gbe19a8e5dc_0_168:notes"/>
+          <p:cNvSpPr>
+            <a:spLocks noGrp="1" noRot="1" noChangeAspect="1"/>
+          </p:cNvSpPr>
+          <p:nvPr>
+            <p:ph type="sldImg" idx="2"/>
+          </p:nvPr>
+        </p:nvSpPr>
+        <p:spPr>
+          <a:xfrm>
+            <a:off x="381000" y="685800"/>
+            <a:ext cx="6096000" cy="3429000"/>
+          </a:xfrm>
+          <a:custGeom>
+            <a:avLst/>
+            <a:gdLst/>
+            <a:ahLst/>
+            <a:cxnLst/>
+            <a:rect l="l" t="t" r="r" b="b"/>
+            <a:pathLst>
+              <a:path w="120000" h="120000" extrusionOk="0">
+                <a:moveTo>
+                  <a:pt x="0" y="0"/>
+                </a:moveTo>
+                <a:lnTo>
+                  <a:pt x="120000" y="0"/>
+                </a:lnTo>
+                <a:lnTo>
+                  <a:pt x="120000" y="120000"/>
+                </a:lnTo>
+                <a:lnTo>
+                  <a:pt x="0" y="120000"/>
+                </a:lnTo>
+                <a:close/>
+              </a:path>
+            </a:pathLst>
+          </a:custGeom>
+        </p:spPr>
+      </p:sp>
+      <p:sp>
+        <p:nvSpPr>
+          <p:cNvPr id="1784" name="Google Shape;1784;gbe19a8e5dc_0_168:notes"/>
+          <p:cNvSpPr txBox="1">
+            <a:spLocks noGrp="1"/>
+          </p:cNvSpPr>
+          <p:nvPr>
+            <p:ph type="body" idx="1"/>
+          </p:nvPr>
+        </p:nvSpPr>
+        <p:spPr>
+          <a:xfrm>
+            <a:off x="685800" y="4343400"/>
+            <a:ext cx="5486400" cy="4114800"/>
+          </a:xfrm>
+          <a:prstGeom prst="rect">
+            <a:avLst/>
+          </a:prstGeom>
+        </p:spPr>
+        <p:txBody>
+          <a:bodyPr spcFirstLastPara="1" wrap="square" lIns="91425" tIns="91425" rIns="91425" bIns="91425" anchor="t" anchorCtr="0">
+            <a:noAutofit/>
+          </a:bodyPr>
+          <a:lstStyle/>
+          <a:p>
+            <a:pPr marL="0" lvl="0" indent="0" algn="l" rtl="0">
+              <a:spcBef>
+                <a:spcPts val="0"/>
+              </a:spcBef>
+              <a:spcAft>
+                <a:spcPts val="0"/>
+              </a:spcAft>
+              <a:buNone/>
+            </a:pPr>
+            <a:endParaRPr/>
+          </a:p>
+        </p:txBody>
+      </p:sp>
+    </p:spTree>
+    <p:extLst>
+      <p:ext uri="{BB962C8B-B14F-4D97-AF65-F5344CB8AC3E}">
+        <p14:creationId xmlns:p14="http://schemas.microsoft.com/office/powerpoint/2010/main" val="485044"/>
+      </p:ext>
+    </p:extLst>
+  </p:cSld>
+  <p:clrMapOvr>
+    <a:masterClrMapping/>
+  </p:clrMapOvr>
+</p:notes>
+</file>
+
+<file path=ppt/notesSlides/notesSlide15.xml><?xml version="1.0" encoding="utf-8"?>
+<p:notes xmlns:a="http://schemas.openxmlformats.org/drawingml/2006/main" xmlns:r="http://schemas.openxmlformats.org/officeDocument/2006/relationships" xmlns:p="http://schemas.openxmlformats.org/presentationml/2006/main" showMasterSp="0" showMasterPhAnim="0">
+  <p:cSld>
+    <p:spTree>
+      <p:nvGrpSpPr>
+        <p:cNvPr id="1" name="Shape 1782"/>
+        <p:cNvGrpSpPr/>
+        <p:nvPr/>
+      </p:nvGrpSpPr>
+      <p:grpSpPr>
+        <a:xfrm>
+          <a:off x="0" y="0"/>
+          <a:ext cx="0" cy="0"/>
+          <a:chOff x="0" y="0"/>
+          <a:chExt cx="0" cy="0"/>
+        </a:xfrm>
+      </p:grpSpPr>
+      <p:sp>
+        <p:nvSpPr>
+          <p:cNvPr id="1783" name="Google Shape;1783;gbe19a8e5dc_0_168:notes"/>
+          <p:cNvSpPr>
+            <a:spLocks noGrp="1" noRot="1" noChangeAspect="1"/>
+          </p:cNvSpPr>
+          <p:nvPr>
+            <p:ph type="sldImg" idx="2"/>
+          </p:nvPr>
+        </p:nvSpPr>
+        <p:spPr>
+          <a:xfrm>
+            <a:off x="381000" y="685800"/>
+            <a:ext cx="6096000" cy="3429000"/>
+          </a:xfrm>
+          <a:custGeom>
+            <a:avLst/>
+            <a:gdLst/>
+            <a:ahLst/>
+            <a:cxnLst/>
+            <a:rect l="l" t="t" r="r" b="b"/>
+            <a:pathLst>
+              <a:path w="120000" h="120000" extrusionOk="0">
+                <a:moveTo>
+                  <a:pt x="0" y="0"/>
+                </a:moveTo>
+                <a:lnTo>
+                  <a:pt x="120000" y="0"/>
+                </a:lnTo>
+                <a:lnTo>
+                  <a:pt x="120000" y="120000"/>
+                </a:lnTo>
+                <a:lnTo>
+                  <a:pt x="0" y="120000"/>
+                </a:lnTo>
+                <a:close/>
+              </a:path>
+            </a:pathLst>
+          </a:custGeom>
+        </p:spPr>
+      </p:sp>
+      <p:sp>
+        <p:nvSpPr>
+          <p:cNvPr id="1784" name="Google Shape;1784;gbe19a8e5dc_0_168:notes"/>
+          <p:cNvSpPr txBox="1">
+            <a:spLocks noGrp="1"/>
+          </p:cNvSpPr>
+          <p:nvPr>
+            <p:ph type="body" idx="1"/>
+          </p:nvPr>
+        </p:nvSpPr>
+        <p:spPr>
+          <a:xfrm>
+            <a:off x="685800" y="4343400"/>
+            <a:ext cx="5486400" cy="4114800"/>
+          </a:xfrm>
+          <a:prstGeom prst="rect">
+            <a:avLst/>
+          </a:prstGeom>
+        </p:spPr>
+        <p:txBody>
+          <a:bodyPr spcFirstLastPara="1" wrap="square" lIns="91425" tIns="91425" rIns="91425" bIns="91425" anchor="t" anchorCtr="0">
+            <a:noAutofit/>
+          </a:bodyPr>
+          <a:lstStyle/>
+          <a:p>
+            <a:pPr marL="0" lvl="0" indent="0" algn="l" rtl="0">
+              <a:spcBef>
+                <a:spcPts val="0"/>
+              </a:spcBef>
+              <a:spcAft>
+                <a:spcPts val="0"/>
+              </a:spcAft>
+              <a:buNone/>
+            </a:pPr>
+            <a:endParaRPr/>
+          </a:p>
+        </p:txBody>
+      </p:sp>
+    </p:spTree>
+    <p:extLst>
+      <p:ext uri="{BB962C8B-B14F-4D97-AF65-F5344CB8AC3E}">
+        <p14:creationId xmlns:p14="http://schemas.microsoft.com/office/powerpoint/2010/main" val="3538565563"/>
+      </p:ext>
+    </p:extLst>
+  </p:cSld>
+  <p:clrMapOvr>
+    <a:masterClrMapping/>
+  </p:clrMapOvr>
+</p:notes>
+</file>
+
+<file path=ppt/notesSlides/notesSlide16.xml><?xml version="1.0" encoding="utf-8"?>
+<p:notes xmlns:a="http://schemas.openxmlformats.org/drawingml/2006/main" xmlns:r="http://schemas.openxmlformats.org/officeDocument/2006/relationships" xmlns:p="http://schemas.openxmlformats.org/presentationml/2006/main" showMasterSp="0" showMasterPhAnim="0">
+  <p:cSld>
+    <p:spTree>
+      <p:nvGrpSpPr>
         <p:cNvPr id="1" name="Shape 1818"/>
         <p:cNvGrpSpPr/>
         <p:nvPr/>
@@ -5034,7 +5694,7 @@
   <p:cSld>
     <p:spTree>
       <p:nvGrpSpPr>
-        <p:cNvPr id="1" name="Shape 1782"/>
+        <p:cNvPr id="1" name="Shape 742"/>
         <p:cNvGrpSpPr/>
         <p:nvPr/>
       </p:nvGrpSpPr>
@@ -5048,7 +5708,7 @@
       </p:grpSpPr>
       <p:sp>
         <p:nvSpPr>
-          <p:cNvPr id="1783" name="Google Shape;1783;gbe19a8e5dc_0_168:notes"/>
+          <p:cNvPr id="743" name="Google Shape;743;gbe14d50368_0_0:notes"/>
           <p:cNvSpPr>
             <a:spLocks noGrp="1" noRot="1" noChangeAspect="1"/>
           </p:cNvSpPr>
@@ -5089,7 +5749,7 @@
       </p:sp>
       <p:sp>
         <p:nvSpPr>
-          <p:cNvPr id="1784" name="Google Shape;1784;gbe19a8e5dc_0_168:notes"/>
+          <p:cNvPr id="744" name="Google Shape;744;gbe14d50368_0_0:notes"/>
           <p:cNvSpPr txBox="1">
             <a:spLocks noGrp="1"/>
           </p:cNvSpPr>
@@ -5126,6 +5786,11 @@
         </p:txBody>
       </p:sp>
     </p:spTree>
+    <p:extLst>
+      <p:ext uri="{BB962C8B-B14F-4D97-AF65-F5344CB8AC3E}">
+        <p14:creationId xmlns:p14="http://schemas.microsoft.com/office/powerpoint/2010/main" val="3906522380"/>
+      </p:ext>
+    </p:extLst>
   </p:cSld>
   <p:clrMapOvr>
     <a:masterClrMapping/>
@@ -5230,11 +5895,6 @@
         </p:txBody>
       </p:sp>
     </p:spTree>
-    <p:extLst>
-      <p:ext uri="{BB962C8B-B14F-4D97-AF65-F5344CB8AC3E}">
-        <p14:creationId xmlns:p14="http://schemas.microsoft.com/office/powerpoint/2010/main" val="3538565563"/>
-      </p:ext>
-    </p:extLst>
   </p:cSld>
   <p:clrMapOvr>
     <a:masterClrMapping/>
@@ -21454,6 +22114,766 @@
   <p:cSld>
     <p:spTree>
       <p:nvGrpSpPr>
+        <p:cNvPr id="1" name="Shape 735"/>
+        <p:cNvGrpSpPr/>
+        <p:nvPr/>
+      </p:nvGrpSpPr>
+      <p:grpSpPr>
+        <a:xfrm>
+          <a:off x="0" y="0"/>
+          <a:ext cx="0" cy="0"/>
+          <a:chOff x="0" y="0"/>
+          <a:chExt cx="0" cy="0"/>
+        </a:xfrm>
+      </p:grpSpPr>
+      <p:sp>
+        <p:nvSpPr>
+          <p:cNvPr id="739" name="Google Shape;739;p41"/>
+          <p:cNvSpPr txBox="1">
+            <a:spLocks noGrp="1"/>
+          </p:cNvSpPr>
+          <p:nvPr>
+            <p:ph type="title"/>
+          </p:nvPr>
+        </p:nvSpPr>
+        <p:spPr>
+          <a:xfrm>
+            <a:off x="2295150" y="2019750"/>
+            <a:ext cx="4553700" cy="1104000"/>
+          </a:xfrm>
+          <a:prstGeom prst="rect">
+            <a:avLst/>
+          </a:prstGeom>
+        </p:spPr>
+        <p:txBody>
+          <a:bodyPr spcFirstLastPara="1" wrap="square" lIns="91425" tIns="91425" rIns="91425" bIns="91425" anchor="ctr" anchorCtr="0">
+            <a:noAutofit/>
+          </a:bodyPr>
+          <a:lstStyle/>
+          <a:p>
+            <a:pPr marL="0" lvl="0" indent="0" algn="ctr" rtl="0">
+              <a:spcBef>
+                <a:spcPts val="0"/>
+              </a:spcBef>
+              <a:spcAft>
+                <a:spcPts val="0"/>
+              </a:spcAft>
+              <a:buNone/>
+            </a:pPr>
+            <a:r>
+              <a:rPr lang="bg-BG" dirty="0"/>
+              <a:t>Роли</a:t>
+            </a:r>
+          </a:p>
+        </p:txBody>
+      </p:sp>
+    </p:spTree>
+    <p:extLst>
+      <p:ext uri="{BB962C8B-B14F-4D97-AF65-F5344CB8AC3E}">
+        <p14:creationId xmlns:p14="http://schemas.microsoft.com/office/powerpoint/2010/main" val="1648702908"/>
+      </p:ext>
+    </p:extLst>
+  </p:cSld>
+  <p:clrMapOvr>
+    <a:masterClrMapping/>
+  </p:clrMapOvr>
+</p:sld>
+</file>
+
+<file path=ppt/slides/slide11.xml><?xml version="1.0" encoding="utf-8"?>
+<p:sld xmlns:a="http://schemas.openxmlformats.org/drawingml/2006/main" xmlns:r="http://schemas.openxmlformats.org/officeDocument/2006/relationships" xmlns:p="http://schemas.openxmlformats.org/presentationml/2006/main">
+  <p:cSld>
+    <p:spTree>
+      <p:nvGrpSpPr>
+        <p:cNvPr id="1" name="Shape 1785"/>
+        <p:cNvGrpSpPr/>
+        <p:nvPr/>
+      </p:nvGrpSpPr>
+      <p:grpSpPr>
+        <a:xfrm>
+          <a:off x="0" y="0"/>
+          <a:ext cx="0" cy="0"/>
+          <a:chOff x="0" y="0"/>
+          <a:chExt cx="0" cy="0"/>
+        </a:xfrm>
+      </p:grpSpPr>
+      <p:sp>
+        <p:nvSpPr>
+          <p:cNvPr id="1786" name="Google Shape;1786;p66"/>
+          <p:cNvSpPr txBox="1">
+            <a:spLocks noGrp="1"/>
+          </p:cNvSpPr>
+          <p:nvPr>
+            <p:ph type="title"/>
+          </p:nvPr>
+        </p:nvSpPr>
+        <p:spPr>
+          <a:xfrm>
+            <a:off x="758775" y="368825"/>
+            <a:ext cx="7626300" cy="572700"/>
+          </a:xfrm>
+          <a:prstGeom prst="rect">
+            <a:avLst/>
+          </a:prstGeom>
+        </p:spPr>
+        <p:txBody>
+          <a:bodyPr spcFirstLastPara="1" wrap="square" lIns="91425" tIns="91425" rIns="91425" bIns="91425" anchor="ctr" anchorCtr="0">
+            <a:noAutofit/>
+          </a:bodyPr>
+          <a:lstStyle/>
+          <a:p>
+            <a:pPr marL="0" lvl="0" indent="0" algn="ctr" rtl="0">
+              <a:spcBef>
+                <a:spcPts val="0"/>
+              </a:spcBef>
+              <a:spcAft>
+                <a:spcPts val="0"/>
+              </a:spcAft>
+              <a:buNone/>
+            </a:pPr>
+            <a:r>
+              <a:rPr lang="bg-BG" dirty="0"/>
+              <a:t>Клиент</a:t>
+            </a:r>
+            <a:endParaRPr lang="en-US" dirty="0"/>
+          </a:p>
+        </p:txBody>
+      </p:sp>
+      <p:pic>
+        <p:nvPicPr>
+          <p:cNvPr id="3" name="Picture 2" descr="A picture containing text, businesscard, vector graphics&#10;&#10;Description automatically generated">
+            <a:extLst>
+              <a:ext uri="{FF2B5EF4-FFF2-40B4-BE49-F238E27FC236}">
+                <a16:creationId xmlns:a16="http://schemas.microsoft.com/office/drawing/2014/main" id="{99ACAFC4-6BC2-4A06-A454-6AC6F1883D21}"/>
+              </a:ext>
+            </a:extLst>
+          </p:cNvPr>
+          <p:cNvPicPr>
+            <a:picLocks noChangeAspect="1"/>
+          </p:cNvPicPr>
+          <p:nvPr/>
+        </p:nvPicPr>
+        <p:blipFill>
+          <a:blip r:embed="rId3"/>
+          <a:stretch>
+            <a:fillRect/>
+          </a:stretch>
+        </p:blipFill>
+        <p:spPr>
+          <a:xfrm>
+            <a:off x="2196838" y="655175"/>
+            <a:ext cx="4750173" cy="4750173"/>
+          </a:xfrm>
+          <a:prstGeom prst="rect">
+            <a:avLst/>
+          </a:prstGeom>
+        </p:spPr>
+      </p:pic>
+    </p:spTree>
+    <p:extLst>
+      <p:ext uri="{BB962C8B-B14F-4D97-AF65-F5344CB8AC3E}">
+        <p14:creationId xmlns:p14="http://schemas.microsoft.com/office/powerpoint/2010/main" val="3286144026"/>
+      </p:ext>
+    </p:extLst>
+  </p:cSld>
+  <p:clrMapOvr>
+    <a:masterClrMapping/>
+  </p:clrMapOvr>
+</p:sld>
+</file>
+
+<file path=ppt/slides/slide12.xml><?xml version="1.0" encoding="utf-8"?>
+<p:sld xmlns:a="http://schemas.openxmlformats.org/drawingml/2006/main" xmlns:r="http://schemas.openxmlformats.org/officeDocument/2006/relationships" xmlns:p="http://schemas.openxmlformats.org/presentationml/2006/main">
+  <p:cSld>
+    <p:spTree>
+      <p:nvGrpSpPr>
+        <p:cNvPr id="1" name="Shape 1785"/>
+        <p:cNvGrpSpPr/>
+        <p:nvPr/>
+      </p:nvGrpSpPr>
+      <p:grpSpPr>
+        <a:xfrm>
+          <a:off x="0" y="0"/>
+          <a:ext cx="0" cy="0"/>
+          <a:chOff x="0" y="0"/>
+          <a:chExt cx="0" cy="0"/>
+        </a:xfrm>
+      </p:grpSpPr>
+      <p:sp>
+        <p:nvSpPr>
+          <p:cNvPr id="1786" name="Google Shape;1786;p66"/>
+          <p:cNvSpPr txBox="1">
+            <a:spLocks noGrp="1"/>
+          </p:cNvSpPr>
+          <p:nvPr>
+            <p:ph type="title"/>
+          </p:nvPr>
+        </p:nvSpPr>
+        <p:spPr>
+          <a:xfrm>
+            <a:off x="758775" y="368825"/>
+            <a:ext cx="7626300" cy="572700"/>
+          </a:xfrm>
+          <a:prstGeom prst="rect">
+            <a:avLst/>
+          </a:prstGeom>
+        </p:spPr>
+        <p:txBody>
+          <a:bodyPr spcFirstLastPara="1" wrap="square" lIns="91425" tIns="91425" rIns="91425" bIns="91425" anchor="ctr" anchorCtr="0">
+            <a:noAutofit/>
+          </a:bodyPr>
+          <a:lstStyle/>
+          <a:p>
+            <a:pPr marL="0" lvl="0" indent="0" algn="ctr" rtl="0">
+              <a:spcBef>
+                <a:spcPts val="0"/>
+              </a:spcBef>
+              <a:spcAft>
+                <a:spcPts val="0"/>
+              </a:spcAft>
+              <a:buNone/>
+            </a:pPr>
+            <a:r>
+              <a:rPr lang="bg-BG" dirty="0"/>
+              <a:t>Таксиметров шофьор</a:t>
+            </a:r>
+            <a:endParaRPr lang="en-US" dirty="0"/>
+          </a:p>
+        </p:txBody>
+      </p:sp>
+      <p:pic>
+        <p:nvPicPr>
+          <p:cNvPr id="8" name="Picture 7" descr="A person standing next to a yellow car&#10;&#10;Description automatically generated with medium confidence">
+            <a:extLst>
+              <a:ext uri="{FF2B5EF4-FFF2-40B4-BE49-F238E27FC236}">
+                <a16:creationId xmlns:a16="http://schemas.microsoft.com/office/drawing/2014/main" id="{F127B98C-1823-4943-81C2-0EDB6099EACA}"/>
+              </a:ext>
+            </a:extLst>
+          </p:cNvPr>
+          <p:cNvPicPr>
+            <a:picLocks noChangeAspect="1"/>
+          </p:cNvPicPr>
+          <p:nvPr/>
+        </p:nvPicPr>
+        <p:blipFill>
+          <a:blip r:embed="rId3"/>
+          <a:stretch>
+            <a:fillRect/>
+          </a:stretch>
+        </p:blipFill>
+        <p:spPr>
+          <a:xfrm>
+            <a:off x="1699765" y="-300410"/>
+            <a:ext cx="5744320" cy="5744320"/>
+          </a:xfrm>
+          <a:prstGeom prst="rect">
+            <a:avLst/>
+          </a:prstGeom>
+        </p:spPr>
+      </p:pic>
+    </p:spTree>
+    <p:extLst>
+      <p:ext uri="{BB962C8B-B14F-4D97-AF65-F5344CB8AC3E}">
+        <p14:creationId xmlns:p14="http://schemas.microsoft.com/office/powerpoint/2010/main" val="58228238"/>
+      </p:ext>
+    </p:extLst>
+  </p:cSld>
+  <p:clrMapOvr>
+    <a:masterClrMapping/>
+  </p:clrMapOvr>
+</p:sld>
+</file>
+
+<file path=ppt/slides/slide13.xml><?xml version="1.0" encoding="utf-8"?>
+<p:sld xmlns:a="http://schemas.openxmlformats.org/drawingml/2006/main" xmlns:r="http://schemas.openxmlformats.org/officeDocument/2006/relationships" xmlns:p="http://schemas.openxmlformats.org/presentationml/2006/main">
+  <p:cSld>
+    <p:spTree>
+      <p:nvGrpSpPr>
+        <p:cNvPr id="1" name="Shape 1785"/>
+        <p:cNvGrpSpPr/>
+        <p:nvPr/>
+      </p:nvGrpSpPr>
+      <p:grpSpPr>
+        <a:xfrm>
+          <a:off x="0" y="0"/>
+          <a:ext cx="0" cy="0"/>
+          <a:chOff x="0" y="0"/>
+          <a:chExt cx="0" cy="0"/>
+        </a:xfrm>
+      </p:grpSpPr>
+      <p:sp>
+        <p:nvSpPr>
+          <p:cNvPr id="1786" name="Google Shape;1786;p66"/>
+          <p:cNvSpPr txBox="1">
+            <a:spLocks noGrp="1"/>
+          </p:cNvSpPr>
+          <p:nvPr>
+            <p:ph type="title"/>
+          </p:nvPr>
+        </p:nvSpPr>
+        <p:spPr>
+          <a:xfrm>
+            <a:off x="758775" y="368825"/>
+            <a:ext cx="7626300" cy="572700"/>
+          </a:xfrm>
+          <a:prstGeom prst="rect">
+            <a:avLst/>
+          </a:prstGeom>
+        </p:spPr>
+        <p:txBody>
+          <a:bodyPr spcFirstLastPara="1" wrap="square" lIns="91425" tIns="91425" rIns="91425" bIns="91425" anchor="ctr" anchorCtr="0">
+            <a:noAutofit/>
+          </a:bodyPr>
+          <a:lstStyle/>
+          <a:p>
+            <a:pPr marL="0" lvl="0" indent="0" algn="ctr" rtl="0">
+              <a:spcBef>
+                <a:spcPts val="0"/>
+              </a:spcBef>
+              <a:spcAft>
+                <a:spcPts val="0"/>
+              </a:spcAft>
+              <a:buNone/>
+            </a:pPr>
+            <a:r>
+              <a:rPr lang="bg-BG" dirty="0"/>
+              <a:t>Диспечер</a:t>
+            </a:r>
+            <a:endParaRPr lang="en-US" dirty="0"/>
+          </a:p>
+        </p:txBody>
+      </p:sp>
+      <p:pic>
+        <p:nvPicPr>
+          <p:cNvPr id="4" name="Picture 3" descr="A picture containing text, vector graphics, businesscard&#10;&#10;Description automatically generated">
+            <a:extLst>
+              <a:ext uri="{FF2B5EF4-FFF2-40B4-BE49-F238E27FC236}">
+                <a16:creationId xmlns:a16="http://schemas.microsoft.com/office/drawing/2014/main" id="{06F71F68-01C5-4210-9162-1E4C3108A9FA}"/>
+              </a:ext>
+            </a:extLst>
+          </p:cNvPr>
+          <p:cNvPicPr>
+            <a:picLocks noChangeAspect="1"/>
+          </p:cNvPicPr>
+          <p:nvPr/>
+        </p:nvPicPr>
+        <p:blipFill>
+          <a:blip r:embed="rId3"/>
+          <a:stretch>
+            <a:fillRect/>
+          </a:stretch>
+        </p:blipFill>
+        <p:spPr>
+          <a:xfrm>
+            <a:off x="1857052" y="504336"/>
+            <a:ext cx="4981070" cy="4981070"/>
+          </a:xfrm>
+          <a:prstGeom prst="rect">
+            <a:avLst/>
+          </a:prstGeom>
+        </p:spPr>
+      </p:pic>
+    </p:spTree>
+    <p:extLst>
+      <p:ext uri="{BB962C8B-B14F-4D97-AF65-F5344CB8AC3E}">
+        <p14:creationId xmlns:p14="http://schemas.microsoft.com/office/powerpoint/2010/main" val="2930957989"/>
+      </p:ext>
+    </p:extLst>
+  </p:cSld>
+  <p:clrMapOvr>
+    <a:masterClrMapping/>
+  </p:clrMapOvr>
+</p:sld>
+</file>
+
+<file path=ppt/slides/slide14.xml><?xml version="1.0" encoding="utf-8"?>
+<p:sld xmlns:a="http://schemas.openxmlformats.org/drawingml/2006/main" xmlns:r="http://schemas.openxmlformats.org/officeDocument/2006/relationships" xmlns:p="http://schemas.openxmlformats.org/presentationml/2006/main">
+  <p:cSld>
+    <p:spTree>
+      <p:nvGrpSpPr>
+        <p:cNvPr id="1" name="Shape 1785"/>
+        <p:cNvGrpSpPr/>
+        <p:nvPr/>
+      </p:nvGrpSpPr>
+      <p:grpSpPr>
+        <a:xfrm>
+          <a:off x="0" y="0"/>
+          <a:ext cx="0" cy="0"/>
+          <a:chOff x="0" y="0"/>
+          <a:chExt cx="0" cy="0"/>
+        </a:xfrm>
+      </p:grpSpPr>
+      <p:sp>
+        <p:nvSpPr>
+          <p:cNvPr id="1786" name="Google Shape;1786;p66"/>
+          <p:cNvSpPr txBox="1">
+            <a:spLocks noGrp="1"/>
+          </p:cNvSpPr>
+          <p:nvPr>
+            <p:ph type="title"/>
+          </p:nvPr>
+        </p:nvSpPr>
+        <p:spPr>
+          <a:xfrm>
+            <a:off x="758775" y="368825"/>
+            <a:ext cx="7626300" cy="572700"/>
+          </a:xfrm>
+          <a:prstGeom prst="rect">
+            <a:avLst/>
+          </a:prstGeom>
+        </p:spPr>
+        <p:txBody>
+          <a:bodyPr spcFirstLastPara="1" wrap="square" lIns="91425" tIns="91425" rIns="91425" bIns="91425" anchor="ctr" anchorCtr="0">
+            <a:noAutofit/>
+          </a:bodyPr>
+          <a:lstStyle/>
+          <a:p>
+            <a:pPr marL="0" lvl="0" indent="0" algn="ctr" rtl="0">
+              <a:spcBef>
+                <a:spcPts val="0"/>
+              </a:spcBef>
+              <a:spcAft>
+                <a:spcPts val="0"/>
+              </a:spcAft>
+              <a:buNone/>
+            </a:pPr>
+            <a:r>
+              <a:rPr lang="bg-BG" dirty="0"/>
+              <a:t>Мениджър</a:t>
+            </a:r>
+            <a:endParaRPr lang="en-US" dirty="0"/>
+          </a:p>
+        </p:txBody>
+      </p:sp>
+      <p:pic>
+        <p:nvPicPr>
+          <p:cNvPr id="4" name="Picture 3" descr="A person in a suit&#10;&#10;Description automatically generated with low confidence">
+            <a:extLst>
+              <a:ext uri="{FF2B5EF4-FFF2-40B4-BE49-F238E27FC236}">
+                <a16:creationId xmlns:a16="http://schemas.microsoft.com/office/drawing/2014/main" id="{EC5268ED-C22E-4479-98EF-2B5764C26313}"/>
+              </a:ext>
+            </a:extLst>
+          </p:cNvPr>
+          <p:cNvPicPr>
+            <a:picLocks noChangeAspect="1"/>
+          </p:cNvPicPr>
+          <p:nvPr/>
+        </p:nvPicPr>
+        <p:blipFill>
+          <a:blip r:embed="rId3"/>
+          <a:stretch>
+            <a:fillRect/>
+          </a:stretch>
+        </p:blipFill>
+        <p:spPr>
+          <a:xfrm>
+            <a:off x="2063860" y="504409"/>
+            <a:ext cx="4758359" cy="4758359"/>
+          </a:xfrm>
+          <a:prstGeom prst="rect">
+            <a:avLst/>
+          </a:prstGeom>
+        </p:spPr>
+      </p:pic>
+    </p:spTree>
+    <p:extLst>
+      <p:ext uri="{BB962C8B-B14F-4D97-AF65-F5344CB8AC3E}">
+        <p14:creationId xmlns:p14="http://schemas.microsoft.com/office/powerpoint/2010/main" val="2762745968"/>
+      </p:ext>
+    </p:extLst>
+  </p:cSld>
+  <p:clrMapOvr>
+    <a:masterClrMapping/>
+  </p:clrMapOvr>
+</p:sld>
+</file>
+
+<file path=ppt/slides/slide15.xml><?xml version="1.0" encoding="utf-8"?>
+<p:sld xmlns:a="http://schemas.openxmlformats.org/drawingml/2006/main" xmlns:r="http://schemas.openxmlformats.org/officeDocument/2006/relationships" xmlns:p="http://schemas.openxmlformats.org/presentationml/2006/main">
+  <p:cSld>
+    <p:spTree>
+      <p:nvGrpSpPr>
+        <p:cNvPr id="1" name="Shape 1785"/>
+        <p:cNvGrpSpPr/>
+        <p:nvPr/>
+      </p:nvGrpSpPr>
+      <p:grpSpPr>
+        <a:xfrm>
+          <a:off x="0" y="0"/>
+          <a:ext cx="0" cy="0"/>
+          <a:chOff x="0" y="0"/>
+          <a:chExt cx="0" cy="0"/>
+        </a:xfrm>
+      </p:grpSpPr>
+      <p:sp>
+        <p:nvSpPr>
+          <p:cNvPr id="1786" name="Google Shape;1786;p66"/>
+          <p:cNvSpPr txBox="1">
+            <a:spLocks noGrp="1"/>
+          </p:cNvSpPr>
+          <p:nvPr>
+            <p:ph type="title"/>
+          </p:nvPr>
+        </p:nvSpPr>
+        <p:spPr>
+          <a:xfrm>
+            <a:off x="758775" y="368825"/>
+            <a:ext cx="7626300" cy="572700"/>
+          </a:xfrm>
+          <a:prstGeom prst="rect">
+            <a:avLst/>
+          </a:prstGeom>
+        </p:spPr>
+        <p:txBody>
+          <a:bodyPr spcFirstLastPara="1" wrap="square" lIns="91425" tIns="91425" rIns="91425" bIns="91425" anchor="ctr" anchorCtr="0">
+            <a:noAutofit/>
+          </a:bodyPr>
+          <a:lstStyle/>
+          <a:p>
+            <a:pPr marL="0" lvl="0" indent="0" algn="ctr" rtl="0">
+              <a:spcBef>
+                <a:spcPts val="0"/>
+              </a:spcBef>
+              <a:spcAft>
+                <a:spcPts val="0"/>
+              </a:spcAft>
+              <a:buNone/>
+            </a:pPr>
+            <a:r>
+              <a:rPr lang="bg-BG" dirty="0"/>
+              <a:t>Мобилна версия</a:t>
+            </a:r>
+            <a:endParaRPr lang="en-US" dirty="0"/>
+          </a:p>
+        </p:txBody>
+      </p:sp>
+      <p:sp>
+        <p:nvSpPr>
+          <p:cNvPr id="1787" name="Google Shape;1787;p66"/>
+          <p:cNvSpPr txBox="1">
+            <a:spLocks noGrp="1"/>
+          </p:cNvSpPr>
+          <p:nvPr>
+            <p:ph type="subTitle" idx="1"/>
+          </p:nvPr>
+        </p:nvSpPr>
+        <p:spPr>
+          <a:xfrm>
+            <a:off x="1377125" y="3122600"/>
+            <a:ext cx="2497500" cy="572700"/>
+          </a:xfrm>
+          <a:prstGeom prst="rect">
+            <a:avLst/>
+          </a:prstGeom>
+        </p:spPr>
+        <p:txBody>
+          <a:bodyPr spcFirstLastPara="1" wrap="square" lIns="91425" tIns="91425" rIns="91425" bIns="91425" anchor="t" anchorCtr="0">
+            <a:noAutofit/>
+          </a:bodyPr>
+          <a:lstStyle/>
+          <a:p>
+            <a:pPr marL="0" lvl="0" indent="0" algn="l" rtl="0">
+              <a:spcBef>
+                <a:spcPts val="600"/>
+              </a:spcBef>
+              <a:spcAft>
+                <a:spcPts val="0"/>
+              </a:spcAft>
+              <a:buNone/>
+            </a:pPr>
+            <a:r>
+              <a:rPr lang="en-US" sz="1400" dirty="0">
+                <a:hlinkClick r:id="rId3"/>
+              </a:rPr>
+              <a:t>http://31.13.201.183/</a:t>
+            </a:r>
+            <a:r>
+              <a:rPr lang="en-US" sz="1400" dirty="0"/>
+              <a:t> </a:t>
+            </a:r>
+          </a:p>
+        </p:txBody>
+      </p:sp>
+      <p:pic>
+        <p:nvPicPr>
+          <p:cNvPr id="1788" name="Google Shape;1788;p66"/>
+          <p:cNvPicPr preferRelativeResize="0"/>
+          <p:nvPr/>
+        </p:nvPicPr>
+        <p:blipFill rotWithShape="1">
+          <a:blip r:embed="rId4">
+            <a:alphaModFix/>
+          </a:blip>
+          <a:srcRect l="5626" r="5626"/>
+          <a:stretch/>
+        </p:blipFill>
+        <p:spPr>
+          <a:xfrm>
+            <a:off x="4670419" y="1116030"/>
+            <a:ext cx="1580400" cy="3133500"/>
+          </a:xfrm>
+          <a:prstGeom prst="roundRect">
+            <a:avLst>
+              <a:gd name="adj" fmla="val 6764"/>
+            </a:avLst>
+          </a:prstGeom>
+          <a:noFill/>
+          <a:ln>
+            <a:noFill/>
+          </a:ln>
+        </p:spPr>
+      </p:pic>
+      <p:sp>
+        <p:nvSpPr>
+          <p:cNvPr id="1789" name="Google Shape;1789;p66"/>
+          <p:cNvSpPr/>
+          <p:nvPr/>
+        </p:nvSpPr>
+        <p:spPr>
+          <a:xfrm>
+            <a:off x="4630763" y="1302287"/>
+            <a:ext cx="1659712" cy="3212116"/>
+          </a:xfrm>
+          <a:custGeom>
+            <a:avLst/>
+            <a:gdLst/>
+            <a:ahLst/>
+            <a:cxnLst/>
+            <a:rect l="l" t="t" r="r" b="b"/>
+            <a:pathLst>
+              <a:path w="39332" h="76121" extrusionOk="0">
+                <a:moveTo>
+                  <a:pt x="34097" y="1598"/>
+                </a:moveTo>
+                <a:cubicBezTo>
+                  <a:pt x="36138" y="1598"/>
+                  <a:pt x="37794" y="3254"/>
+                  <a:pt x="37794" y="5294"/>
+                </a:cubicBezTo>
+                <a:lnTo>
+                  <a:pt x="37794" y="70827"/>
+                </a:lnTo>
+                <a:lnTo>
+                  <a:pt x="37853" y="70827"/>
+                </a:lnTo>
+                <a:cubicBezTo>
+                  <a:pt x="37853" y="72867"/>
+                  <a:pt x="36197" y="74523"/>
+                  <a:pt x="34156" y="74523"/>
+                </a:cubicBezTo>
+                <a:lnTo>
+                  <a:pt x="5175" y="74523"/>
+                </a:lnTo>
+                <a:cubicBezTo>
+                  <a:pt x="3135" y="74523"/>
+                  <a:pt x="1479" y="72867"/>
+                  <a:pt x="1479" y="70827"/>
+                </a:cubicBezTo>
+                <a:lnTo>
+                  <a:pt x="1479" y="5294"/>
+                </a:lnTo>
+                <a:cubicBezTo>
+                  <a:pt x="1479" y="3254"/>
+                  <a:pt x="3135" y="1598"/>
+                  <a:pt x="5175" y="1598"/>
+                </a:cubicBezTo>
+                <a:lnTo>
+                  <a:pt x="10203" y="1598"/>
+                </a:lnTo>
+                <a:cubicBezTo>
+                  <a:pt x="10617" y="2367"/>
+                  <a:pt x="11681" y="3786"/>
+                  <a:pt x="14047" y="3934"/>
+                </a:cubicBezTo>
+                <a:lnTo>
+                  <a:pt x="25225" y="3934"/>
+                </a:lnTo>
+                <a:cubicBezTo>
+                  <a:pt x="27650" y="3786"/>
+                  <a:pt x="28685" y="2367"/>
+                  <a:pt x="29070" y="1598"/>
+                </a:cubicBezTo>
+                <a:close/>
+                <a:moveTo>
+                  <a:pt x="4702" y="1"/>
+                </a:moveTo>
+                <a:cubicBezTo>
+                  <a:pt x="2100" y="1"/>
+                  <a:pt x="0" y="2130"/>
+                  <a:pt x="0" y="4703"/>
+                </a:cubicBezTo>
+                <a:lnTo>
+                  <a:pt x="0" y="71418"/>
+                </a:lnTo>
+                <a:cubicBezTo>
+                  <a:pt x="0" y="74021"/>
+                  <a:pt x="2100" y="76120"/>
+                  <a:pt x="4702" y="76120"/>
+                </a:cubicBezTo>
+                <a:lnTo>
+                  <a:pt x="34629" y="76120"/>
+                </a:lnTo>
+                <a:cubicBezTo>
+                  <a:pt x="37232" y="76120"/>
+                  <a:pt x="39331" y="74021"/>
+                  <a:pt x="39331" y="71418"/>
+                </a:cubicBezTo>
+                <a:lnTo>
+                  <a:pt x="39331" y="4703"/>
+                </a:lnTo>
+                <a:cubicBezTo>
+                  <a:pt x="39331" y="2130"/>
+                  <a:pt x="37232" y="1"/>
+                  <a:pt x="34629" y="1"/>
+                </a:cubicBezTo>
+                <a:close/>
+              </a:path>
+            </a:pathLst>
+          </a:custGeom>
+          <a:solidFill>
+            <a:schemeClr val="accent5"/>
+          </a:solidFill>
+          <a:ln>
+            <a:noFill/>
+          </a:ln>
+        </p:spPr>
+        <p:txBody>
+          <a:bodyPr spcFirstLastPara="1" wrap="square" lIns="91425" tIns="91425" rIns="91425" bIns="91425" anchor="ctr" anchorCtr="0">
+            <a:noAutofit/>
+          </a:bodyPr>
+          <a:lstStyle/>
+          <a:p>
+            <a:pPr marL="0" lvl="0" indent="0" algn="l" rtl="0">
+              <a:spcBef>
+                <a:spcPts val="0"/>
+              </a:spcBef>
+              <a:spcAft>
+                <a:spcPts val="0"/>
+              </a:spcAft>
+              <a:buNone/>
+            </a:pPr>
+            <a:endParaRPr/>
+          </a:p>
+        </p:txBody>
+      </p:sp>
+    </p:spTree>
+    <p:extLst>
+      <p:ext uri="{BB962C8B-B14F-4D97-AF65-F5344CB8AC3E}">
+        <p14:creationId xmlns:p14="http://schemas.microsoft.com/office/powerpoint/2010/main" val="2490748645"/>
+      </p:ext>
+    </p:extLst>
+  </p:cSld>
+  <p:clrMapOvr>
+    <a:masterClrMapping/>
+  </p:clrMapOvr>
+</p:sld>
+</file>
+
+<file path=ppt/slides/slide16.xml><?xml version="1.0" encoding="utf-8"?>
+<p:sld xmlns:a="http://schemas.openxmlformats.org/drawingml/2006/main" xmlns:r="http://schemas.openxmlformats.org/officeDocument/2006/relationships" xmlns:p="http://schemas.openxmlformats.org/presentationml/2006/main">
+  <p:cSld>
+    <p:spTree>
+      <p:nvGrpSpPr>
         <p:cNvPr id="1" name="Shape 1821"/>
         <p:cNvGrpSpPr/>
         <p:nvPr/>
@@ -52460,6 +53880,107 @@
   <p:cSld>
     <p:spTree>
       <p:nvGrpSpPr>
+        <p:cNvPr id="1" name="Shape 745"/>
+        <p:cNvGrpSpPr/>
+        <p:nvPr/>
+      </p:nvGrpSpPr>
+      <p:grpSpPr>
+        <a:xfrm>
+          <a:off x="0" y="0"/>
+          <a:ext cx="0" cy="0"/>
+          <a:chOff x="0" y="0"/>
+          <a:chExt cx="0" cy="0"/>
+        </a:xfrm>
+      </p:grpSpPr>
+      <p:sp>
+        <p:nvSpPr>
+          <p:cNvPr id="746" name="Google Shape;746;p42"/>
+          <p:cNvSpPr txBox="1">
+            <a:spLocks noGrp="1"/>
+          </p:cNvSpPr>
+          <p:nvPr>
+            <p:ph type="title"/>
+          </p:nvPr>
+        </p:nvSpPr>
+        <p:spPr>
+          <a:xfrm>
+            <a:off x="1217354" y="1055510"/>
+            <a:ext cx="4521101" cy="3018515"/>
+          </a:xfrm>
+          <a:prstGeom prst="rect">
+            <a:avLst/>
+          </a:prstGeom>
+        </p:spPr>
+        <p:txBody>
+          <a:bodyPr spcFirstLastPara="1" wrap="square" lIns="91425" tIns="91425" rIns="91425" bIns="91425" anchor="ctr" anchorCtr="0">
+            <a:noAutofit/>
+          </a:bodyPr>
+          <a:lstStyle/>
+          <a:p>
+            <a:pPr marL="0" lvl="0" indent="0" algn="l" rtl="0">
+              <a:spcBef>
+                <a:spcPts val="0"/>
+              </a:spcBef>
+              <a:spcAft>
+                <a:spcPts val="0"/>
+              </a:spcAft>
+              <a:buNone/>
+            </a:pPr>
+            <a:r>
+              <a:rPr lang="bg-BG" sz="3600" dirty="0"/>
+              <a:t>Логическо и функционално описание на решението</a:t>
+            </a:r>
+          </a:p>
+        </p:txBody>
+      </p:sp>
+      <p:pic>
+        <p:nvPicPr>
+          <p:cNvPr id="4" name="Picture 3" descr="A picture containing text, vector graphics&#10;&#10;Description automatically generated">
+            <a:extLst>
+              <a:ext uri="{FF2B5EF4-FFF2-40B4-BE49-F238E27FC236}">
+                <a16:creationId xmlns:a16="http://schemas.microsoft.com/office/drawing/2014/main" id="{9820C885-CA2D-483F-BD1F-D15F74B01018}"/>
+              </a:ext>
+            </a:extLst>
+          </p:cNvPr>
+          <p:cNvPicPr>
+            <a:picLocks noChangeAspect="1"/>
+          </p:cNvPicPr>
+          <p:nvPr/>
+        </p:nvPicPr>
+        <p:blipFill>
+          <a:blip r:embed="rId3"/>
+          <a:stretch>
+            <a:fillRect/>
+          </a:stretch>
+        </p:blipFill>
+        <p:spPr>
+          <a:xfrm>
+            <a:off x="4968759" y="1092806"/>
+            <a:ext cx="2957887" cy="2957887"/>
+          </a:xfrm>
+          <a:prstGeom prst="rect">
+            <a:avLst/>
+          </a:prstGeom>
+        </p:spPr>
+      </p:pic>
+    </p:spTree>
+    <p:extLst>
+      <p:ext uri="{BB962C8B-B14F-4D97-AF65-F5344CB8AC3E}">
+        <p14:creationId xmlns:p14="http://schemas.microsoft.com/office/powerpoint/2010/main" val="2799805485"/>
+      </p:ext>
+    </p:extLst>
+  </p:cSld>
+  <p:clrMapOvr>
+    <a:masterClrMapping/>
+  </p:clrMapOvr>
+</p:sld>
+</file>
+
+<file path=ppt/slides/slide9.xml><?xml version="1.0" encoding="utf-8"?>
+<p:sld xmlns:a="http://schemas.openxmlformats.org/drawingml/2006/main" xmlns:r="http://schemas.openxmlformats.org/officeDocument/2006/relationships" xmlns:p="http://schemas.openxmlformats.org/presentationml/2006/main">
+  <p:cSld>
+    <p:spTree>
+      <p:nvGrpSpPr>
         <p:cNvPr id="1" name="Shape 1785"/>
         <p:cNvGrpSpPr/>
         <p:nvPr/>
@@ -53570,287 +55091,6 @@
         </p:txBody>
       </p:sp>
     </p:spTree>
-  </p:cSld>
-  <p:clrMapOvr>
-    <a:masterClrMapping/>
-  </p:clrMapOvr>
-</p:sld>
-</file>
-
-<file path=ppt/slides/slide9.xml><?xml version="1.0" encoding="utf-8"?>
-<p:sld xmlns:a="http://schemas.openxmlformats.org/drawingml/2006/main" xmlns:r="http://schemas.openxmlformats.org/officeDocument/2006/relationships" xmlns:p="http://schemas.openxmlformats.org/presentationml/2006/main">
-  <p:cSld>
-    <p:spTree>
-      <p:nvGrpSpPr>
-        <p:cNvPr id="1" name="Shape 1785"/>
-        <p:cNvGrpSpPr/>
-        <p:nvPr/>
-      </p:nvGrpSpPr>
-      <p:grpSpPr>
-        <a:xfrm>
-          <a:off x="0" y="0"/>
-          <a:ext cx="0" cy="0"/>
-          <a:chOff x="0" y="0"/>
-          <a:chExt cx="0" cy="0"/>
-        </a:xfrm>
-      </p:grpSpPr>
-      <p:sp>
-        <p:nvSpPr>
-          <p:cNvPr id="1786" name="Google Shape;1786;p66"/>
-          <p:cNvSpPr txBox="1">
-            <a:spLocks noGrp="1"/>
-          </p:cNvSpPr>
-          <p:nvPr>
-            <p:ph type="title"/>
-          </p:nvPr>
-        </p:nvSpPr>
-        <p:spPr>
-          <a:xfrm>
-            <a:off x="758775" y="368825"/>
-            <a:ext cx="7626300" cy="572700"/>
-          </a:xfrm>
-          <a:prstGeom prst="rect">
-            <a:avLst/>
-          </a:prstGeom>
-        </p:spPr>
-        <p:txBody>
-          <a:bodyPr spcFirstLastPara="1" wrap="square" lIns="91425" tIns="91425" rIns="91425" bIns="91425" anchor="ctr" anchorCtr="0">
-            <a:noAutofit/>
-          </a:bodyPr>
-          <a:lstStyle/>
-          <a:p>
-            <a:pPr marL="0" lvl="0" indent="0" algn="ctr" rtl="0">
-              <a:spcBef>
-                <a:spcPts val="0"/>
-              </a:spcBef>
-              <a:spcAft>
-                <a:spcPts val="0"/>
-              </a:spcAft>
-              <a:buNone/>
-            </a:pPr>
-            <a:r>
-              <a:rPr lang="bg-BG" dirty="0"/>
-              <a:t>Мобилна версия</a:t>
-            </a:r>
-            <a:endParaRPr lang="en-US" dirty="0"/>
-          </a:p>
-        </p:txBody>
-      </p:sp>
-      <p:sp>
-        <p:nvSpPr>
-          <p:cNvPr id="1787" name="Google Shape;1787;p66"/>
-          <p:cNvSpPr txBox="1">
-            <a:spLocks noGrp="1"/>
-          </p:cNvSpPr>
-          <p:nvPr>
-            <p:ph type="subTitle" idx="1"/>
-          </p:nvPr>
-        </p:nvSpPr>
-        <p:spPr>
-          <a:xfrm>
-            <a:off x="1377125" y="3122600"/>
-            <a:ext cx="2497500" cy="572700"/>
-          </a:xfrm>
-          <a:prstGeom prst="rect">
-            <a:avLst/>
-          </a:prstGeom>
-        </p:spPr>
-        <p:txBody>
-          <a:bodyPr spcFirstLastPara="1" wrap="square" lIns="91425" tIns="91425" rIns="91425" bIns="91425" anchor="t" anchorCtr="0">
-            <a:noAutofit/>
-          </a:bodyPr>
-          <a:lstStyle/>
-          <a:p>
-            <a:pPr marL="0" lvl="0" indent="0" algn="l" rtl="0">
-              <a:spcBef>
-                <a:spcPts val="600"/>
-              </a:spcBef>
-              <a:spcAft>
-                <a:spcPts val="0"/>
-              </a:spcAft>
-              <a:buNone/>
-            </a:pPr>
-            <a:r>
-              <a:rPr lang="en-US" sz="1400" dirty="0">
-                <a:hlinkClick r:id="rId3"/>
-              </a:rPr>
-              <a:t>http://31.13.201.183/</a:t>
-            </a:r>
-            <a:r>
-              <a:rPr lang="en-US" sz="1400" dirty="0"/>
-              <a:t> </a:t>
-            </a:r>
-          </a:p>
-        </p:txBody>
-      </p:sp>
-      <p:pic>
-        <p:nvPicPr>
-          <p:cNvPr id="1788" name="Google Shape;1788;p66"/>
-          <p:cNvPicPr preferRelativeResize="0"/>
-          <p:nvPr/>
-        </p:nvPicPr>
-        <p:blipFill rotWithShape="1">
-          <a:blip r:embed="rId4">
-            <a:alphaModFix/>
-          </a:blip>
-          <a:srcRect l="5626" r="5626"/>
-          <a:stretch/>
-        </p:blipFill>
-        <p:spPr>
-          <a:xfrm>
-            <a:off x="4670419" y="1116030"/>
-            <a:ext cx="1580400" cy="3133500"/>
-          </a:xfrm>
-          <a:prstGeom prst="roundRect">
-            <a:avLst>
-              <a:gd name="adj" fmla="val 6764"/>
-            </a:avLst>
-          </a:prstGeom>
-          <a:noFill/>
-          <a:ln>
-            <a:noFill/>
-          </a:ln>
-        </p:spPr>
-      </p:pic>
-      <p:sp>
-        <p:nvSpPr>
-          <p:cNvPr id="1789" name="Google Shape;1789;p66"/>
-          <p:cNvSpPr/>
-          <p:nvPr/>
-        </p:nvSpPr>
-        <p:spPr>
-          <a:xfrm>
-            <a:off x="4630763" y="1302287"/>
-            <a:ext cx="1659712" cy="3212116"/>
-          </a:xfrm>
-          <a:custGeom>
-            <a:avLst/>
-            <a:gdLst/>
-            <a:ahLst/>
-            <a:cxnLst/>
-            <a:rect l="l" t="t" r="r" b="b"/>
-            <a:pathLst>
-              <a:path w="39332" h="76121" extrusionOk="0">
-                <a:moveTo>
-                  <a:pt x="34097" y="1598"/>
-                </a:moveTo>
-                <a:cubicBezTo>
-                  <a:pt x="36138" y="1598"/>
-                  <a:pt x="37794" y="3254"/>
-                  <a:pt x="37794" y="5294"/>
-                </a:cubicBezTo>
-                <a:lnTo>
-                  <a:pt x="37794" y="70827"/>
-                </a:lnTo>
-                <a:lnTo>
-                  <a:pt x="37853" y="70827"/>
-                </a:lnTo>
-                <a:cubicBezTo>
-                  <a:pt x="37853" y="72867"/>
-                  <a:pt x="36197" y="74523"/>
-                  <a:pt x="34156" y="74523"/>
-                </a:cubicBezTo>
-                <a:lnTo>
-                  <a:pt x="5175" y="74523"/>
-                </a:lnTo>
-                <a:cubicBezTo>
-                  <a:pt x="3135" y="74523"/>
-                  <a:pt x="1479" y="72867"/>
-                  <a:pt x="1479" y="70827"/>
-                </a:cubicBezTo>
-                <a:lnTo>
-                  <a:pt x="1479" y="5294"/>
-                </a:lnTo>
-                <a:cubicBezTo>
-                  <a:pt x="1479" y="3254"/>
-                  <a:pt x="3135" y="1598"/>
-                  <a:pt x="5175" y="1598"/>
-                </a:cubicBezTo>
-                <a:lnTo>
-                  <a:pt x="10203" y="1598"/>
-                </a:lnTo>
-                <a:cubicBezTo>
-                  <a:pt x="10617" y="2367"/>
-                  <a:pt x="11681" y="3786"/>
-                  <a:pt x="14047" y="3934"/>
-                </a:cubicBezTo>
-                <a:lnTo>
-                  <a:pt x="25225" y="3934"/>
-                </a:lnTo>
-                <a:cubicBezTo>
-                  <a:pt x="27650" y="3786"/>
-                  <a:pt x="28685" y="2367"/>
-                  <a:pt x="29070" y="1598"/>
-                </a:cubicBezTo>
-                <a:close/>
-                <a:moveTo>
-                  <a:pt x="4702" y="1"/>
-                </a:moveTo>
-                <a:cubicBezTo>
-                  <a:pt x="2100" y="1"/>
-                  <a:pt x="0" y="2130"/>
-                  <a:pt x="0" y="4703"/>
-                </a:cubicBezTo>
-                <a:lnTo>
-                  <a:pt x="0" y="71418"/>
-                </a:lnTo>
-                <a:cubicBezTo>
-                  <a:pt x="0" y="74021"/>
-                  <a:pt x="2100" y="76120"/>
-                  <a:pt x="4702" y="76120"/>
-                </a:cubicBezTo>
-                <a:lnTo>
-                  <a:pt x="34629" y="76120"/>
-                </a:lnTo>
-                <a:cubicBezTo>
-                  <a:pt x="37232" y="76120"/>
-                  <a:pt x="39331" y="74021"/>
-                  <a:pt x="39331" y="71418"/>
-                </a:cubicBezTo>
-                <a:lnTo>
-                  <a:pt x="39331" y="4703"/>
-                </a:lnTo>
-                <a:cubicBezTo>
-                  <a:pt x="39331" y="2130"/>
-                  <a:pt x="37232" y="1"/>
-                  <a:pt x="34629" y="1"/>
-                </a:cubicBezTo>
-                <a:close/>
-              </a:path>
-            </a:pathLst>
-          </a:custGeom>
-          <a:solidFill>
-            <a:schemeClr val="accent5"/>
-          </a:solidFill>
-          <a:ln>
-            <a:noFill/>
-          </a:ln>
-        </p:spPr>
-        <p:txBody>
-          <a:bodyPr spcFirstLastPara="1" wrap="square" lIns="91425" tIns="91425" rIns="91425" bIns="91425" anchor="ctr" anchorCtr="0">
-            <a:noAutofit/>
-          </a:bodyPr>
-          <a:lstStyle/>
-          <a:p>
-            <a:pPr marL="0" lvl="0" indent="0" algn="l" rtl="0">
-              <a:spcBef>
-                <a:spcPts val="0"/>
-              </a:spcBef>
-              <a:spcAft>
-                <a:spcPts val="0"/>
-              </a:spcAft>
-              <a:buNone/>
-            </a:pPr>
-            <a:endParaRPr/>
-          </a:p>
-        </p:txBody>
-      </p:sp>
-    </p:spTree>
-    <p:extLst>
-      <p:ext uri="{BB962C8B-B14F-4D97-AF65-F5344CB8AC3E}">
-        <p14:creationId xmlns:p14="http://schemas.microsoft.com/office/powerpoint/2010/main" val="2490748645"/>
-      </p:ext>
-    </p:extLst>
   </p:cSld>
   <p:clrMapOvr>
     <a:masterClrMapping/>

</xml_diff>